<commit_message>
ran files for check
</commit_message>
<xml_diff>
--- a/401-template/writing/Calvin_DA401_Poster.pptx
+++ b/401-template/writing/Calvin_DA401_Poster.pptx
@@ -303,7 +303,7 @@
             <a:fld id="{AA6250D1-D96A-1849-87B9-1AABDD2E4612}" type="datetimeFigureOut">
               <a:rPr lang="en-US" smtClean="0"/>
               <a:pPr/>
-              <a:t>12/11/2025</a:t>
+              <a:t>12/12/2025</a:t>
             </a:fld>
             <a:endParaRPr lang="en-US"/>
           </a:p>
@@ -468,7 +468,7 @@
             <a:fld id="{AA6250D1-D96A-1849-87B9-1AABDD2E4612}" type="datetimeFigureOut">
               <a:rPr lang="en-US" smtClean="0"/>
               <a:pPr/>
-              <a:t>12/11/2025</a:t>
+              <a:t>12/12/2025</a:t>
             </a:fld>
             <a:endParaRPr lang="en-US"/>
           </a:p>
@@ -643,7 +643,7 @@
             <a:fld id="{AA6250D1-D96A-1849-87B9-1AABDD2E4612}" type="datetimeFigureOut">
               <a:rPr lang="en-US" smtClean="0"/>
               <a:pPr/>
-              <a:t>12/11/2025</a:t>
+              <a:t>12/12/2025</a:t>
             </a:fld>
             <a:endParaRPr lang="en-US"/>
           </a:p>
@@ -808,7 +808,7 @@
             <a:fld id="{AA6250D1-D96A-1849-87B9-1AABDD2E4612}" type="datetimeFigureOut">
               <a:rPr lang="en-US" smtClean="0"/>
               <a:pPr/>
-              <a:t>12/11/2025</a:t>
+              <a:t>12/12/2025</a:t>
             </a:fld>
             <a:endParaRPr lang="en-US"/>
           </a:p>
@@ -1050,7 +1050,7 @@
             <a:fld id="{AA6250D1-D96A-1849-87B9-1AABDD2E4612}" type="datetimeFigureOut">
               <a:rPr lang="en-US" smtClean="0"/>
               <a:pPr/>
-              <a:t>12/11/2025</a:t>
+              <a:t>12/12/2025</a:t>
             </a:fld>
             <a:endParaRPr lang="en-US"/>
           </a:p>
@@ -1332,7 +1332,7 @@
             <a:fld id="{AA6250D1-D96A-1849-87B9-1AABDD2E4612}" type="datetimeFigureOut">
               <a:rPr lang="en-US" smtClean="0"/>
               <a:pPr/>
-              <a:t>12/11/2025</a:t>
+              <a:t>12/12/2025</a:t>
             </a:fld>
             <a:endParaRPr lang="en-US"/>
           </a:p>
@@ -1748,7 +1748,7 @@
             <a:fld id="{AA6250D1-D96A-1849-87B9-1AABDD2E4612}" type="datetimeFigureOut">
               <a:rPr lang="en-US" smtClean="0"/>
               <a:pPr/>
-              <a:t>12/11/2025</a:t>
+              <a:t>12/12/2025</a:t>
             </a:fld>
             <a:endParaRPr lang="en-US"/>
           </a:p>
@@ -1862,7 +1862,7 @@
             <a:fld id="{AA6250D1-D96A-1849-87B9-1AABDD2E4612}" type="datetimeFigureOut">
               <a:rPr lang="en-US" smtClean="0"/>
               <a:pPr/>
-              <a:t>12/11/2025</a:t>
+              <a:t>12/12/2025</a:t>
             </a:fld>
             <a:endParaRPr lang="en-US"/>
           </a:p>
@@ -1954,7 +1954,7 @@
             <a:fld id="{AA6250D1-D96A-1849-87B9-1AABDD2E4612}" type="datetimeFigureOut">
               <a:rPr lang="en-US" smtClean="0"/>
               <a:pPr/>
-              <a:t>12/11/2025</a:t>
+              <a:t>12/12/2025</a:t>
             </a:fld>
             <a:endParaRPr lang="en-US"/>
           </a:p>
@@ -2226,7 +2226,7 @@
             <a:fld id="{AA6250D1-D96A-1849-87B9-1AABDD2E4612}" type="datetimeFigureOut">
               <a:rPr lang="en-US" smtClean="0"/>
               <a:pPr/>
-              <a:t>12/11/2025</a:t>
+              <a:t>12/12/2025</a:t>
             </a:fld>
             <a:endParaRPr lang="en-US"/>
           </a:p>
@@ -2475,7 +2475,7 @@
             <a:fld id="{AA6250D1-D96A-1849-87B9-1AABDD2E4612}" type="datetimeFigureOut">
               <a:rPr lang="en-US" smtClean="0"/>
               <a:pPr/>
-              <a:t>12/11/2025</a:t>
+              <a:t>12/12/2025</a:t>
             </a:fld>
             <a:endParaRPr lang="en-US"/>
           </a:p>
@@ -2683,7 +2683,7 @@
             <a:fld id="{AA6250D1-D96A-1849-87B9-1AABDD2E4612}" type="datetimeFigureOut">
               <a:rPr lang="en-US" smtClean="0"/>
               <a:pPr/>
-              <a:t>12/11/2025</a:t>
+              <a:t>12/12/2025</a:t>
             </a:fld>
             <a:endParaRPr lang="en-US"/>
           </a:p>
@@ -3130,8 +3130,8 @@
         </p:nvSpPr>
         <p:spPr>
           <a:xfrm>
-            <a:off x="1905026" y="7850771"/>
-            <a:ext cx="10410596" cy="9144000"/>
+            <a:off x="1140104" y="7802461"/>
+            <a:ext cx="10410596" cy="9235440"/>
           </a:xfrm>
           <a:prstGeom prst="rect">
             <a:avLst/>
@@ -3152,8 +3152,8 @@
             <a:pPr algn="ctr"/>
             <a:r>
               <a:rPr lang="en-US" sz="4400" dirty="0">
-                <a:latin typeface="Arial"/>
-                <a:cs typeface="Arial"/>
+                <a:latin typeface="Times New Roman" panose="02020603050405020304" pitchFamily="18" charset="0"/>
+                <a:cs typeface="Times New Roman" panose="02020603050405020304" pitchFamily="18" charset="0"/>
               </a:rPr>
               <a:t>Introduction</a:t>
             </a:r>
@@ -3261,8 +3261,8 @@
         </p:nvSpPr>
         <p:spPr>
           <a:xfrm>
-            <a:off x="12653259" y="7850771"/>
-            <a:ext cx="13599525" cy="10772180"/>
+            <a:off x="12103828" y="7802461"/>
+            <a:ext cx="14188647" cy="12311063"/>
           </a:xfrm>
           <a:prstGeom prst="rect">
             <a:avLst/>
@@ -3283,91 +3283,106 @@
             <a:pPr algn="ctr"/>
             <a:r>
               <a:rPr lang="en-US" sz="4400" dirty="0">
-                <a:latin typeface="Arial"/>
-                <a:cs typeface="Arial"/>
+                <a:latin typeface="Times New Roman" panose="02020603050405020304" pitchFamily="18" charset="0"/>
+                <a:cs typeface="Times New Roman" panose="02020603050405020304" pitchFamily="18" charset="0"/>
               </a:rPr>
               <a:t>Results</a:t>
             </a:r>
           </a:p>
           <a:p>
-            <a:endParaRPr lang="en-US" sz="4400" dirty="0"/>
-          </a:p>
-          <a:p>
-            <a:r>
-              <a:rPr lang="en-US" sz="3200" dirty="0">
-                <a:latin typeface="Times New Roman"/>
-                <a:cs typeface="Times New Roman"/>
-              </a:rPr>
-              <a:t>We found that ….</a:t>
-            </a:r>
-          </a:p>
-          <a:p>
-            <a:endParaRPr lang="en-US" sz="3200" dirty="0">
-              <a:latin typeface="Times New Roman"/>
-              <a:cs typeface="Times New Roman"/>
-            </a:endParaRPr>
-          </a:p>
-          <a:p>
-            <a:r>
-              <a:rPr lang="en-US" sz="3200" dirty="0">
-                <a:latin typeface="Times New Roman"/>
-                <a:cs typeface="Times New Roman"/>
-              </a:rPr>
-              <a:t>This section can be written as a bulleted list or with complete sentences that describe your results/scholarly findings.  You can include graphs, figures, photographs in separate boxes as part of your results.  Take a look at scholarly posters hanging in your department/program for ideas on how to write and show your scholarly findings.  The results might take up more than one column on your poster.</a:t>
-            </a:r>
-          </a:p>
-          <a:p>
-            <a:endParaRPr lang="en-US" sz="3200" dirty="0">
-              <a:latin typeface="Times New Roman"/>
-              <a:cs typeface="Times New Roman"/>
-            </a:endParaRPr>
-          </a:p>
-          <a:p>
-            <a:r>
-              <a:rPr lang="en-US" sz="3200" dirty="0">
-                <a:latin typeface="Times New Roman"/>
-                <a:cs typeface="Times New Roman"/>
-              </a:rPr>
-              <a:t>Again this box is simply a text box with purple 10 pt lines framing the box.   The header in this example is size 44 and the general text is size 32.</a:t>
-            </a:r>
-          </a:p>
-          <a:p>
-            <a:endParaRPr lang="en-US" sz="3200" dirty="0">
-              <a:latin typeface="Times New Roman"/>
-              <a:cs typeface="Times New Roman"/>
-            </a:endParaRPr>
-          </a:p>
-          <a:p>
-            <a:r>
-              <a:rPr lang="en-US" sz="3200" dirty="0">
-                <a:latin typeface="Times New Roman"/>
-                <a:cs typeface="Times New Roman"/>
-              </a:rPr>
-              <a:t>Use a font size of 24-32 pts for the general text of your poster.  Your poster will be easier to read if the general text is written with a serif font, such as Palatino, Times New Roman (shown here), or  Cambria.</a:t>
-            </a:r>
-          </a:p>
-          <a:p>
-            <a:endParaRPr lang="en-US" sz="3200" dirty="0">
-              <a:latin typeface="Times New Roman"/>
-              <a:cs typeface="Times New Roman"/>
-            </a:endParaRPr>
-          </a:p>
-          <a:p>
-            <a:endParaRPr lang="en-US" sz="3200" dirty="0">
+            <a:pPr marL="457200" indent="-457200">
+              <a:buFont typeface="Arial" panose="020B0604020202020204" pitchFamily="34" charset="0"/>
+              <a:buChar char="•"/>
+            </a:pPr>
+            <a:endParaRPr lang="en-US" sz="3000" dirty="0">
               <a:ln>
                 <a:solidFill>
                   <a:srgbClr val="008000"/>
                 </a:solidFill>
               </a:ln>
-              <a:latin typeface="Times New Roman"/>
-              <a:cs typeface="Times New Roman"/>
+              <a:latin typeface="Times New Roman" panose="02020603050405020304" pitchFamily="18" charset="0"/>
+              <a:cs typeface="Times New Roman" panose="02020603050405020304" pitchFamily="18" charset="0"/>
             </a:endParaRPr>
           </a:p>
           <a:p>
-            <a:endParaRPr lang="en-US" sz="3200" dirty="0">
-              <a:latin typeface="Times New Roman"/>
-              <a:cs typeface="Times New Roman"/>
+            <a:pPr marL="457200" indent="-457200">
+              <a:buFont typeface="Arial" panose="020B0604020202020204" pitchFamily="34" charset="0"/>
+              <a:buChar char="•"/>
+            </a:pPr>
+            <a:r>
+              <a:rPr lang="en-US" sz="3000" dirty="0">
+                <a:latin typeface="Times New Roman" panose="02020603050405020304" pitchFamily="18" charset="0"/>
+                <a:cs typeface="Times New Roman" panose="02020603050405020304" pitchFamily="18" charset="0"/>
+              </a:rPr>
+              <a:t>Treated states begin the period with slightly higher poverty rates among full-time low-wage workers than control states, reflecting underlying differences in economic conditions prior to minimum wage increases.</a:t>
+            </a:r>
+          </a:p>
+          <a:p>
+            <a:pPr marL="457200" indent="-457200">
+              <a:buFont typeface="Arial" panose="020B0604020202020204" pitchFamily="34" charset="0"/>
+              <a:buChar char="•"/>
+            </a:pPr>
+            <a:r>
+              <a:rPr lang="en-US" sz="3000" dirty="0">
+                <a:latin typeface="Times New Roman" panose="02020603050405020304" pitchFamily="18" charset="0"/>
+                <a:cs typeface="Times New Roman" panose="02020603050405020304" pitchFamily="18" charset="0"/>
+              </a:rPr>
+              <a:t>Two-way fixed effects estimates indicate that the relationship between the real minimum wage and poverty is statistically indistinguishable from zero across specifications. </a:t>
+            </a:r>
+          </a:p>
+          <a:p>
+            <a:pPr marL="457200" indent="-457200">
+              <a:buFont typeface="Arial" panose="020B0604020202020204" pitchFamily="34" charset="0"/>
+              <a:buChar char="•"/>
+            </a:pPr>
+            <a:r>
+              <a:rPr lang="en-US" sz="3000" dirty="0">
+                <a:latin typeface="Times New Roman" panose="02020603050405020304" pitchFamily="18" charset="0"/>
+                <a:cs typeface="Times New Roman" panose="02020603050405020304" pitchFamily="18" charset="0"/>
+              </a:rPr>
+              <a:t>Labor market conditions exhibit stronger associations with poverty than the minimum wage itself. </a:t>
+            </a:r>
+          </a:p>
+          <a:p>
+            <a:pPr marL="457200" indent="-457200">
+              <a:buFont typeface="Arial" panose="020B0604020202020204" pitchFamily="34" charset="0"/>
+              <a:buChar char="•"/>
+            </a:pPr>
+            <a:r>
+              <a:rPr lang="en-US" sz="3000" dirty="0">
+                <a:latin typeface="Times New Roman" panose="02020603050405020304" pitchFamily="18" charset="0"/>
+                <a:cs typeface="Times New Roman" panose="02020603050405020304" pitchFamily="18" charset="0"/>
+              </a:rPr>
+              <a:t>SNAP participation is positively and statistically significant in the baseline specification, consistent with program targeting toward economically disadvantaged populations.</a:t>
+            </a:r>
+          </a:p>
+          <a:p>
+            <a:pPr marL="457200" indent="-457200">
+              <a:buFont typeface="Arial" panose="020B0604020202020204" pitchFamily="34" charset="0"/>
+              <a:buChar char="•"/>
+            </a:pPr>
+            <a:r>
+              <a:rPr lang="en-US" sz="3000" dirty="0">
+                <a:latin typeface="Times New Roman" panose="02020603050405020304" pitchFamily="18" charset="0"/>
+                <a:cs typeface="Times New Roman" panose="02020603050405020304" pitchFamily="18" charset="0"/>
+              </a:rPr>
+              <a:t>Demographic characteristics, including educational attainment and racial composition, display smaller and less precisely estimated effects, suggesting more limited explanatory power relative to labor market conditions.</a:t>
+            </a:r>
+          </a:p>
+          <a:p>
+            <a:endParaRPr lang="en-US" sz="3000" dirty="0">
+              <a:latin typeface="Times New Roman" panose="02020603050405020304" pitchFamily="18" charset="0"/>
+              <a:cs typeface="Times New Roman" panose="02020603050405020304" pitchFamily="18" charset="0"/>
             </a:endParaRPr>
+          </a:p>
+          <a:p>
+            <a:r>
+              <a:rPr lang="en-US" sz="3000" dirty="0">
+                <a:latin typeface="Times New Roman" panose="02020603050405020304" pitchFamily="18" charset="0"/>
+                <a:cs typeface="Times New Roman" panose="02020603050405020304" pitchFamily="18" charset="0"/>
+              </a:rPr>
+              <a:t>Event-study results reinforce these findings. In the years leading up to a minimum wage increase, estimated coefficients are small and statistically indistinguishable from zero, indicating no evidence of differential pre-treatment trends between treated and control states. Following treatment, point estimates suggest modest declines in poverty; however, these effects are imprecisely estimated, with confidence intervals widening at longer horizons due to reduced sample sizes. Parallel trends diagnostics further support the identifying assumptions of the difference-in-differences framework, though the post-treatment results should be interpreted cautiously.</a:t>
+            </a:r>
           </a:p>
         </p:txBody>
       </p:sp>
@@ -3379,8 +3394,8 @@
         </p:nvSpPr>
         <p:spPr>
           <a:xfrm>
-            <a:off x="26590422" y="7850771"/>
-            <a:ext cx="11077778" cy="20128587"/>
+            <a:off x="26845603" y="7802461"/>
+            <a:ext cx="11077778" cy="21854160"/>
           </a:xfrm>
           <a:prstGeom prst="rect">
             <a:avLst/>
@@ -3401,23 +3416,14 @@
             <a:pPr algn="ctr"/>
             <a:r>
               <a:rPr lang="en-US" sz="4400" dirty="0">
-                <a:latin typeface="Arial"/>
-                <a:cs typeface="Arial"/>
+                <a:latin typeface="Times New Roman" panose="02020603050405020304" pitchFamily="18" charset="0"/>
+                <a:cs typeface="Times New Roman" panose="02020603050405020304" pitchFamily="18" charset="0"/>
               </a:rPr>
               <a:t>Results</a:t>
             </a:r>
           </a:p>
           <a:p>
             <a:endParaRPr lang="en-US" sz="4400" dirty="0"/>
-          </a:p>
-          <a:p>
-            <a:r>
-              <a:rPr lang="en-US" sz="3200" dirty="0">
-                <a:latin typeface="Times New Roman"/>
-                <a:cs typeface="Times New Roman"/>
-              </a:rPr>
-              <a:t>We also found that ….</a:t>
-            </a:r>
           </a:p>
           <a:p>
             <a:endParaRPr lang="en-US" sz="3200" dirty="0">
@@ -3642,149 +3648,6 @@
           </a:p>
         </p:txBody>
       </p:sp>
-      <p:pic>
-        <p:nvPicPr>
-          <p:cNvPr id="13" name="Picture 998"/>
-          <p:cNvPicPr>
-            <a:picLocks noChangeAspect="1" noChangeArrowheads="1"/>
-          </p:cNvPicPr>
-          <p:nvPr/>
-        </p:nvPicPr>
-        <mc:AlternateContent xmlns:mc="http://schemas.openxmlformats.org/markup-compatibility/2006">
-          <mc:Choice xmlns:ma="http://schemas.microsoft.com/office/mac/drawingml/2008/main" xmlns:mv="urn:schemas-microsoft-com:mac:vml" xmlns="" Requires="ma">
-            <p:blipFill>
-              <a:blip r:embed="rId3"/>
-              <a:srcRect/>
-              <a:stretch>
-                <a:fillRect/>
-              </a:stretch>
-            </p:blipFill>
-          </mc:Choice>
-          <mc:Fallback>
-            <p:blipFill>
-              <a:blip r:embed="rId4"/>
-              <a:srcRect/>
-              <a:stretch>
-                <a:fillRect/>
-              </a:stretch>
-            </p:blipFill>
-          </mc:Fallback>
-        </mc:AlternateContent>
-        <p:spPr bwMode="auto">
-          <a:xfrm>
-            <a:off x="30084292" y="9343001"/>
-            <a:ext cx="7583908" cy="6405000"/>
-          </a:xfrm>
-          <a:prstGeom prst="rect">
-            <a:avLst/>
-          </a:prstGeom>
-          <a:noFill/>
-          <a:ln w="9525">
-            <a:noFill/>
-            <a:miter lim="800000"/>
-            <a:headEnd/>
-            <a:tailEnd/>
-          </a:ln>
-          <a:effectLst/>
-        </p:spPr>
-      </p:pic>
-      <p:sp>
-        <p:nvSpPr>
-          <p:cNvPr id="14" name="Text Box 1003"/>
-          <p:cNvSpPr txBox="1">
-            <a:spLocks noChangeArrowheads="1"/>
-          </p:cNvSpPr>
-          <p:nvPr/>
-        </p:nvSpPr>
-        <p:spPr bwMode="auto">
-          <a:xfrm>
-            <a:off x="30592125" y="15748000"/>
-            <a:ext cx="6400800" cy="1384995"/>
-          </a:xfrm>
-          <a:prstGeom prst="rect">
-            <a:avLst/>
-          </a:prstGeom>
-          <a:noFill/>
-          <a:ln w="9525">
-            <a:noFill/>
-            <a:miter lim="800000"/>
-            <a:headEnd/>
-            <a:tailEnd/>
-          </a:ln>
-          <a:effectLst/>
-        </p:spPr>
-        <p:txBody>
-          <a:bodyPr wrap="square">
-            <a:prstTxWarp prst="textNoShape">
-              <a:avLst/>
-            </a:prstTxWarp>
-            <a:spAutoFit/>
-          </a:bodyPr>
-          <a:lstStyle/>
-          <a:p>
-            <a:pPr defTabSz="915988">
-              <a:spcBef>
-                <a:spcPct val="50000"/>
-              </a:spcBef>
-            </a:pPr>
-            <a:r>
-              <a:rPr lang="en-US" sz="2800" dirty="0">
-                <a:latin typeface="Times New Roman"/>
-                <a:cs typeface="Times New Roman"/>
-              </a:rPr>
-              <a:t>Figure 5: Mean Log Std. CPUE (+ 1SE) for 2004.  CPUE is a measure of the number of animals present in the sample.</a:t>
-            </a:r>
-          </a:p>
-        </p:txBody>
-      </p:sp>
-      <p:sp>
-        <p:nvSpPr>
-          <p:cNvPr id="16" name="Text Box 1007"/>
-          <p:cNvSpPr txBox="1">
-            <a:spLocks noChangeArrowheads="1"/>
-          </p:cNvSpPr>
-          <p:nvPr/>
-        </p:nvSpPr>
-        <p:spPr bwMode="auto">
-          <a:xfrm rot="16200000">
-            <a:off x="29637829" y="13216522"/>
-            <a:ext cx="1570037" cy="338554"/>
-          </a:xfrm>
-          <a:prstGeom prst="rect">
-            <a:avLst/>
-          </a:prstGeom>
-          <a:solidFill>
-            <a:schemeClr val="bg1"/>
-          </a:solidFill>
-          <a:ln w="9525">
-            <a:solidFill>
-              <a:schemeClr val="bg1"/>
-            </a:solidFill>
-            <a:miter lim="800000"/>
-            <a:headEnd/>
-            <a:tailEnd/>
-          </a:ln>
-          <a:effectLst/>
-        </p:spPr>
-        <p:txBody>
-          <a:bodyPr wrap="square">
-            <a:prstTxWarp prst="textNoShape">
-              <a:avLst/>
-            </a:prstTxWarp>
-            <a:spAutoFit/>
-          </a:bodyPr>
-          <a:lstStyle/>
-          <a:p>
-            <a:pPr defTabSz="915988"/>
-            <a:r>
-              <a:rPr lang="en-US" sz="1600" dirty="0">
-                <a:latin typeface="Arial" charset="0"/>
-              </a:rPr>
-              <a:t>Log Std. CPUE</a:t>
-            </a:r>
-          </a:p>
-        </p:txBody>
-      </p:sp>
       <p:sp>
         <p:nvSpPr>
           <p:cNvPr id="17" name="TextBox 16"/>
@@ -3793,8 +3656,8 @@
         </p:nvSpPr>
         <p:spPr>
           <a:xfrm>
-            <a:off x="39652769" y="7850771"/>
-            <a:ext cx="10301253" cy="17527875"/>
+            <a:off x="38470706" y="7774436"/>
+            <a:ext cx="11842701" cy="18374261"/>
           </a:xfrm>
           <a:prstGeom prst="rect">
             <a:avLst/>
@@ -3819,155 +3682,224 @@
             <a:pPr algn="ctr"/>
             <a:r>
               <a:rPr lang="en-US" sz="4400" dirty="0">
-                <a:latin typeface="Arial"/>
-                <a:cs typeface="Arial"/>
+                <a:latin typeface="Times New Roman" panose="02020603050405020304" pitchFamily="18" charset="0"/>
+                <a:cs typeface="Times New Roman" panose="02020603050405020304" pitchFamily="18" charset="0"/>
               </a:rPr>
               <a:t>Discussion</a:t>
             </a:r>
           </a:p>
           <a:p>
-            <a:endParaRPr lang="en-US" sz="4400" dirty="0"/>
+            <a:r>
+              <a:rPr lang="en-US" sz="3000" dirty="0">
+                <a:latin typeface="Times New Roman" panose="02020603050405020304" pitchFamily="18" charset="0"/>
+                <a:cs typeface="Times New Roman" panose="02020603050405020304" pitchFamily="18" charset="0"/>
+              </a:rPr>
+              <a:t>- Do minimum wage increases reduce poverty?</a:t>
+            </a:r>
+          </a:p>
+          <a:p>
+            <a:pPr marL="457200" indent="-457200">
+              <a:buFont typeface="Arial" panose="020B0604020202020204" pitchFamily="34" charset="0"/>
+              <a:buChar char="•"/>
+            </a:pPr>
+            <a:r>
+              <a:rPr lang="en-US" sz="3000" dirty="0">
+                <a:latin typeface="Times New Roman" panose="02020603050405020304" pitchFamily="18" charset="0"/>
+                <a:cs typeface="Times New Roman" panose="02020603050405020304" pitchFamily="18" charset="0"/>
+              </a:rPr>
+              <a:t>Across specifications, minimum wage increases are not associated with statistically precise reductions in poverty among full-time low-wage workers, suggesting that wage floors alone may be insufficient to lift workers above the poverty threshold. </a:t>
+            </a:r>
+          </a:p>
+          <a:p>
+            <a:r>
+              <a:rPr lang="en-US" sz="3000" dirty="0">
+                <a:latin typeface="Times New Roman" panose="02020603050405020304" pitchFamily="18" charset="0"/>
+                <a:cs typeface="Times New Roman" panose="02020603050405020304" pitchFamily="18" charset="0"/>
+              </a:rPr>
+              <a:t>- Role of economic conditions:     </a:t>
+            </a:r>
+          </a:p>
+          <a:p>
+            <a:pPr marL="457200" indent="-457200">
+              <a:buFont typeface="Arial" panose="020B0604020202020204" pitchFamily="34" charset="0"/>
+              <a:buChar char="•"/>
+            </a:pPr>
+            <a:r>
+              <a:rPr lang="en-US" sz="3000" dirty="0">
+                <a:latin typeface="Times New Roman" panose="02020603050405020304" pitchFamily="18" charset="0"/>
+                <a:cs typeface="Times New Roman" panose="02020603050405020304" pitchFamily="18" charset="0"/>
+              </a:rPr>
+              <a:t>Labor market factors, particularly unemployment, exhibit stronger and more consistent relationships with poverty than minimum wage levels</a:t>
+            </a:r>
+          </a:p>
+          <a:p>
+            <a:r>
+              <a:rPr lang="en-US" sz="3000" dirty="0">
+                <a:latin typeface="Times New Roman" panose="02020603050405020304" pitchFamily="18" charset="0"/>
+                <a:cs typeface="Times New Roman" panose="02020603050405020304" pitchFamily="18" charset="0"/>
+              </a:rPr>
+              <a:t>- Program Participation:</a:t>
+            </a:r>
+          </a:p>
+          <a:p>
+            <a:pPr marL="457200" indent="-457200">
+              <a:buFont typeface="Arial" panose="020B0604020202020204" pitchFamily="34" charset="0"/>
+              <a:buChar char="•"/>
+            </a:pPr>
+            <a:r>
+              <a:rPr lang="en-US" sz="3000" dirty="0">
+                <a:latin typeface="Times New Roman" panose="02020603050405020304" pitchFamily="18" charset="0"/>
+                <a:cs typeface="Times New Roman" panose="02020603050405020304" pitchFamily="18" charset="0"/>
+              </a:rPr>
+              <a:t>The positive association between SNAP participation and poverty likely reflects program targeting toward economically vulnerable populations. </a:t>
+            </a:r>
           </a:p>
           <a:p>
             <a:r>
               <a:rPr lang="en-US" sz="3200" dirty="0">
-                <a:latin typeface="Times New Roman"/>
-                <a:cs typeface="Times New Roman"/>
-              </a:rPr>
-              <a:t>These results support the idea that …</a:t>
-            </a:r>
-          </a:p>
-          <a:p>
-            <a:endParaRPr lang="en-US" dirty="0"/>
+                <a:latin typeface="Times New Roman" panose="02020603050405020304" pitchFamily="18" charset="0"/>
+                <a:cs typeface="Times New Roman" panose="02020603050405020304" pitchFamily="18" charset="0"/>
+              </a:rPr>
+              <a:t>Limitations</a:t>
+            </a:r>
           </a:p>
           <a:p>
             <a:r>
               <a:rPr lang="en-US" sz="3200" dirty="0">
-                <a:latin typeface="Times New Roman"/>
-                <a:cs typeface="Times New Roman"/>
-              </a:rPr>
-              <a:t>This section may be written as a list (with bullets) or in complete sentences (as narrative).  This section might be titled discussion or conclusions.  Check with your research mentor on ideas to include in this section and look at other scholarly posters for ideas on how to format this section and on what information to include.</a:t>
-            </a:r>
+                <a:latin typeface="Times New Roman" panose="02020603050405020304" pitchFamily="18" charset="0"/>
+                <a:cs typeface="Times New Roman" panose="02020603050405020304" pitchFamily="18" charset="0"/>
+              </a:rPr>
+              <a:t>- Imprecision and limited post-treatment support</a:t>
+            </a:r>
+          </a:p>
+          <a:p>
+            <a:pPr marL="457200" indent="-457200">
+              <a:buFont typeface="Arial" panose="020B0604020202020204" pitchFamily="34" charset="0"/>
+              <a:buChar char="•"/>
+            </a:pPr>
+            <a:r>
+              <a:rPr lang="en-US" sz="3000" dirty="0">
+                <a:latin typeface="Times New Roman" panose="02020603050405020304" pitchFamily="18" charset="0"/>
+                <a:cs typeface="Times New Roman" panose="02020603050405020304" pitchFamily="18" charset="0"/>
+              </a:rPr>
+              <a:t>Event-study estimates become increasingly imprecise at longer horizons, reflecting fewer treated observations and reduced statistical power.</a:t>
+            </a:r>
+          </a:p>
+          <a:p>
+            <a:r>
+              <a:rPr lang="en-US" sz="3000" dirty="0">
+                <a:latin typeface="Times New Roman" panose="02020603050405020304" pitchFamily="18" charset="0"/>
+                <a:cs typeface="Times New Roman" panose="02020603050405020304" pitchFamily="18" charset="0"/>
+              </a:rPr>
+              <a:t>- Policy variation and scope</a:t>
+            </a:r>
+          </a:p>
+          <a:p>
+            <a:pPr marL="457200" indent="-457200">
+              <a:buFont typeface="Arial" panose="020B0604020202020204" pitchFamily="34" charset="0"/>
+              <a:buChar char="•"/>
+            </a:pPr>
+            <a:r>
+              <a:rPr lang="en-US" sz="3000" dirty="0">
+                <a:latin typeface="Times New Roman" panose="02020603050405020304" pitchFamily="18" charset="0"/>
+                <a:cs typeface="Times New Roman" panose="02020603050405020304" pitchFamily="18" charset="0"/>
+              </a:rPr>
+              <a:t>State-level minimum wage increases vary in magnitude and timing, and many increases are modest relative to prevailing living costs. This limits the ability to detect large poverty effects.</a:t>
+            </a:r>
+          </a:p>
+          <a:p>
+            <a:endParaRPr lang="en-US" sz="3000" dirty="0">
+              <a:latin typeface="Times New Roman" panose="02020603050405020304" pitchFamily="18" charset="0"/>
+              <a:cs typeface="Times New Roman" panose="02020603050405020304" pitchFamily="18" charset="0"/>
+            </a:endParaRPr>
+          </a:p>
+          <a:p>
+            <a:pPr algn="ctr"/>
+            <a:r>
+              <a:rPr lang="en-US" sz="4400" dirty="0">
+                <a:latin typeface="Times New Roman" panose="02020603050405020304" pitchFamily="18" charset="0"/>
+                <a:cs typeface="Times New Roman" panose="02020603050405020304" pitchFamily="18" charset="0"/>
+              </a:rPr>
+              <a:t>Next Steps</a:t>
+            </a:r>
+          </a:p>
+          <a:p>
+            <a:pPr marL="457200" indent="-457200">
+              <a:buFont typeface="Arial" panose="020B0604020202020204" pitchFamily="34" charset="0"/>
+              <a:buChar char="•"/>
+            </a:pPr>
+            <a:r>
+              <a:rPr lang="en-US" sz="3000" dirty="0">
+                <a:latin typeface="Times New Roman" panose="02020603050405020304" pitchFamily="18" charset="0"/>
+                <a:cs typeface="Times New Roman" panose="02020603050405020304" pitchFamily="18" charset="0"/>
+              </a:rPr>
+              <a:t>Examine alternative poverty measures, including household-level or supplemental poverty thresholds, to better reflect income sharing and cost-of-living differences.</a:t>
+            </a:r>
+          </a:p>
+          <a:p>
+            <a:pPr marL="457200" indent="-457200">
+              <a:buFont typeface="Arial" panose="020B0604020202020204" pitchFamily="34" charset="0"/>
+              <a:buChar char="•"/>
+            </a:pPr>
+            <a:r>
+              <a:rPr lang="en-US" sz="3000" dirty="0">
+                <a:latin typeface="Times New Roman" panose="02020603050405020304" pitchFamily="18" charset="0"/>
+                <a:cs typeface="Times New Roman" panose="02020603050405020304" pitchFamily="18" charset="0"/>
+              </a:rPr>
+              <a:t>Incorporate local price or housing cost indices to assess whether minimum wage increases fail to keep pace with rising expenses.</a:t>
+            </a:r>
+          </a:p>
+          <a:p>
+            <a:pPr marL="457200" indent="-457200">
+              <a:buFont typeface="Arial" panose="020B0604020202020204" pitchFamily="34" charset="0"/>
+              <a:buChar char="•"/>
+            </a:pPr>
+            <a:r>
+              <a:rPr lang="en-US" sz="3000" dirty="0">
+                <a:latin typeface="Times New Roman" panose="02020603050405020304" pitchFamily="18" charset="0"/>
+                <a:cs typeface="Times New Roman" panose="02020603050405020304" pitchFamily="18" charset="0"/>
+              </a:rPr>
+              <a:t>Evaluate minimum wage policy alongside complementary anti-poverty programs, such as tax credits or employment subsidies.</a:t>
+            </a:r>
+          </a:p>
+          <a:p>
+            <a:pPr marL="457200" indent="-457200">
+              <a:buFont typeface="Arial" panose="020B0604020202020204" pitchFamily="34" charset="0"/>
+              <a:buChar char="•"/>
+            </a:pPr>
+            <a:endParaRPr lang="en-US" sz="3000" dirty="0">
+              <a:latin typeface="Times New Roman" panose="02020603050405020304" pitchFamily="18" charset="0"/>
+              <a:cs typeface="Times New Roman" panose="02020603050405020304" pitchFamily="18" charset="0"/>
+            </a:endParaRPr>
           </a:p>
           <a:p>
             <a:endParaRPr lang="en-US" sz="3200" dirty="0">
-              <a:latin typeface="Times New Roman"/>
-              <a:cs typeface="Times New Roman"/>
+              <a:latin typeface="Times New Roman" panose="02020603050405020304" pitchFamily="18" charset="0"/>
+              <a:cs typeface="Times New Roman" panose="02020603050405020304" pitchFamily="18" charset="0"/>
             </a:endParaRPr>
           </a:p>
           <a:p>
+            <a:pPr algn="ctr"/>
+            <a:r>
+              <a:rPr lang="en-US" sz="4400" dirty="0">
+                <a:latin typeface="Times New Roman" panose="02020603050405020304" pitchFamily="18" charset="0"/>
+                <a:cs typeface="Times New Roman" panose="02020603050405020304" pitchFamily="18" charset="0"/>
+              </a:rPr>
+              <a:t>Acknowledgements</a:t>
+            </a:r>
             <a:endParaRPr lang="en-US" sz="3200" dirty="0">
-              <a:latin typeface="Times New Roman"/>
-              <a:cs typeface="Times New Roman"/>
+              <a:latin typeface="Times New Roman" panose="02020603050405020304" pitchFamily="18" charset="0"/>
+              <a:cs typeface="Times New Roman" panose="02020603050405020304" pitchFamily="18" charset="0"/>
             </a:endParaRPr>
           </a:p>
           <a:p>
-            <a:endParaRPr lang="en-US" sz="3200" dirty="0">
-              <a:latin typeface="Times New Roman"/>
-              <a:cs typeface="Times New Roman"/>
-            </a:endParaRPr>
-          </a:p>
-          <a:p>
-            <a:endParaRPr lang="en-US" sz="3200" dirty="0">
-              <a:latin typeface="Times New Roman"/>
-              <a:cs typeface="Times New Roman"/>
-            </a:endParaRPr>
-          </a:p>
-          <a:p>
-            <a:pPr algn="ctr"/>
-            <a:r>
-              <a:rPr lang="en-US" sz="4400" dirty="0">
-                <a:latin typeface="Arial"/>
-                <a:cs typeface="Arial"/>
-              </a:rPr>
-              <a:t>Next Steps</a:t>
-            </a:r>
-          </a:p>
-          <a:p>
-            <a:endParaRPr lang="en-US" sz="3200" dirty="0">
-              <a:latin typeface="Times New Roman"/>
-              <a:cs typeface="Times New Roman"/>
-            </a:endParaRPr>
-          </a:p>
-          <a:p>
-            <a:r>
-              <a:rPr lang="en-US" sz="3200" dirty="0">
-                <a:latin typeface="Times New Roman"/>
-                <a:cs typeface="Times New Roman"/>
-              </a:rPr>
-              <a:t>If your project is not complete and you intend to continue your scholarship into the fall semester or for a senior project, you might include a short section that describes your plans/next steps/future directions.</a:t>
-            </a:r>
-          </a:p>
-          <a:p>
-            <a:endParaRPr lang="en-US" sz="3200" dirty="0">
-              <a:latin typeface="Times New Roman"/>
-              <a:cs typeface="Times New Roman"/>
-            </a:endParaRPr>
-          </a:p>
-          <a:p>
-            <a:endParaRPr lang="en-US" sz="3200" dirty="0">
-              <a:latin typeface="Times New Roman"/>
-              <a:cs typeface="Times New Roman"/>
-            </a:endParaRPr>
-          </a:p>
-          <a:p>
-            <a:pPr algn="ctr"/>
-            <a:r>
-              <a:rPr lang="en-US" sz="4400" dirty="0">
-                <a:latin typeface="Arial"/>
-                <a:cs typeface="Arial"/>
-              </a:rPr>
-              <a:t>Acknowledgements</a:t>
-            </a:r>
-          </a:p>
-          <a:p>
-            <a:endParaRPr lang="en-US" sz="3200" dirty="0">
-              <a:latin typeface="Times New Roman"/>
-              <a:cs typeface="Times New Roman"/>
-            </a:endParaRPr>
-          </a:p>
-          <a:p>
-            <a:r>
-              <a:rPr lang="en-US" sz="3200" dirty="0">
-                <a:latin typeface="Times New Roman"/>
-                <a:cs typeface="Times New Roman"/>
-              </a:rPr>
-              <a:t>This project was funded by the __ </a:t>
-            </a:r>
-            <a:r>
-              <a:rPr lang="en-US" sz="3200" u="sng" dirty="0">
-                <a:latin typeface="Times New Roman"/>
-                <a:cs typeface="Times New Roman"/>
-              </a:rPr>
-              <a:t>be sure to get the name correct!</a:t>
-            </a:r>
-            <a:r>
-              <a:rPr lang="en-US" sz="3200" dirty="0">
-                <a:latin typeface="Times New Roman"/>
-                <a:cs typeface="Times New Roman"/>
-              </a:rPr>
-              <a:t>_____ Endowment at Denison University, with additional support from _______.  Jane Doe and Jim </a:t>
-            </a:r>
-            <a:r>
-              <a:rPr lang="en-US" sz="3200" dirty="0" err="1">
-                <a:latin typeface="Times New Roman"/>
-                <a:cs typeface="Times New Roman"/>
-              </a:rPr>
-              <a:t>Noname</a:t>
-            </a:r>
-            <a:r>
-              <a:rPr lang="en-US" sz="3200" dirty="0">
-                <a:latin typeface="Times New Roman"/>
-                <a:cs typeface="Times New Roman"/>
-              </a:rPr>
-              <a:t> assisted with data collection and I appreciated their help.</a:t>
-            </a:r>
-          </a:p>
-          <a:p>
-            <a:endParaRPr lang="en-US" sz="3200" dirty="0">
-              <a:latin typeface="Times New Roman"/>
-              <a:cs typeface="Times New Roman"/>
-            </a:endParaRPr>
+            <a:r>
+              <a:rPr lang="en-US" sz="3000" dirty="0">
+                <a:latin typeface="Times New Roman" panose="02020603050405020304" pitchFamily="18" charset="0"/>
+                <a:cs typeface="Times New Roman" panose="02020603050405020304" pitchFamily="18" charset="0"/>
+              </a:rPr>
+              <a:t>I want to give special thanks to Dr. Wang for her guidance and support throughout this process. Additionally, I would like to thank the Data Analytics department for their teachings and help.</a:t>
+            </a:r>
           </a:p>
         </p:txBody>
       </p:sp>
@@ -3979,8 +3911,8 @@
         </p:nvSpPr>
         <p:spPr>
           <a:xfrm>
-            <a:off x="39641362" y="25968416"/>
-            <a:ext cx="10301253" cy="6032421"/>
+            <a:off x="38470705" y="26602437"/>
+            <a:ext cx="11842701" cy="5852160"/>
           </a:xfrm>
           <a:prstGeom prst="rect">
             <a:avLst/>
@@ -4001,47 +3933,179 @@
             <a:pPr algn="ctr"/>
             <a:r>
               <a:rPr lang="en-US" sz="4400" dirty="0">
-                <a:latin typeface="Arial"/>
-                <a:cs typeface="Arial"/>
+                <a:latin typeface="Times New Roman" panose="02020603050405020304" pitchFamily="18" charset="0"/>
+                <a:cs typeface="Times New Roman" panose="02020603050405020304" pitchFamily="18" charset="0"/>
               </a:rPr>
               <a:t>Works Cited</a:t>
             </a:r>
           </a:p>
           <a:p>
+            <a:r>
+              <a:rPr lang="en-US" sz="2400" dirty="0">
+                <a:latin typeface="Times New Roman" panose="02020603050405020304" pitchFamily="18" charset="0"/>
+                <a:cs typeface="Times New Roman" panose="02020603050405020304" pitchFamily="18" charset="0"/>
+              </a:rPr>
+              <a:t>Bilinski, A., &amp; Hatfield, L. A. (2020). Nothing to see here? Non-inferiority approaches to parallel trends and other model assumptions. </a:t>
+            </a:r>
+            <a:r>
+              <a:rPr lang="en-US" sz="2400" i="1" dirty="0" err="1">
+                <a:latin typeface="Times New Roman" panose="02020603050405020304" pitchFamily="18" charset="0"/>
+                <a:cs typeface="Times New Roman" panose="02020603050405020304" pitchFamily="18" charset="0"/>
+              </a:rPr>
+              <a:t>arXiv</a:t>
+            </a:r>
+            <a:r>
+              <a:rPr lang="en-US" sz="2400" dirty="0">
+                <a:latin typeface="Times New Roman" panose="02020603050405020304" pitchFamily="18" charset="0"/>
+                <a:cs typeface="Times New Roman" panose="02020603050405020304" pitchFamily="18" charset="0"/>
+              </a:rPr>
+              <a:t>. </a:t>
+            </a:r>
+          </a:p>
+          <a:p>
+            <a:r>
+              <a:rPr lang="en-US" sz="2400" dirty="0">
+                <a:latin typeface="Times New Roman" panose="02020603050405020304" pitchFamily="18" charset="0"/>
+                <a:cs typeface="Times New Roman" panose="02020603050405020304" pitchFamily="18" charset="0"/>
+              </a:rPr>
+              <a:t>Callaway, B., &amp; Sant’Anna, P. H. C. (2021). Difference-in-differences with multiple time periods. </a:t>
+            </a:r>
+            <a:r>
+              <a:rPr lang="en-US" sz="2400" i="1" dirty="0">
+                <a:latin typeface="Times New Roman" panose="02020603050405020304" pitchFamily="18" charset="0"/>
+                <a:cs typeface="Times New Roman" panose="02020603050405020304" pitchFamily="18" charset="0"/>
+              </a:rPr>
+              <a:t>Journal of Econometrics, 225</a:t>
+            </a:r>
+            <a:r>
+              <a:rPr lang="en-US" sz="2400" dirty="0">
+                <a:latin typeface="Times New Roman" panose="02020603050405020304" pitchFamily="18" charset="0"/>
+                <a:cs typeface="Times New Roman" panose="02020603050405020304" pitchFamily="18" charset="0"/>
+              </a:rPr>
+              <a:t>(2), 200–230. </a:t>
+            </a:r>
+          </a:p>
+          <a:p>
+            <a:r>
+              <a:rPr lang="en-US" sz="2400" dirty="0">
+                <a:latin typeface="Times New Roman" panose="02020603050405020304" pitchFamily="18" charset="0"/>
+                <a:cs typeface="Times New Roman" panose="02020603050405020304" pitchFamily="18" charset="0"/>
+              </a:rPr>
+              <a:t>Dube, A., Lester, T. W., &amp; Reich, M. (2010). MINIMUM WAGE EFFECTS ACROSS STATE BORDERS: ESTIMATES USING CONTIGUOUS COUNTIES. </a:t>
+            </a:r>
+            <a:r>
+              <a:rPr lang="en-US" sz="2400" i="1" dirty="0">
+                <a:latin typeface="Times New Roman" panose="02020603050405020304" pitchFamily="18" charset="0"/>
+                <a:cs typeface="Times New Roman" panose="02020603050405020304" pitchFamily="18" charset="0"/>
+              </a:rPr>
+              <a:t>The Review of Economics and Statistics</a:t>
+            </a:r>
+            <a:r>
+              <a:rPr lang="en-US" sz="2400" dirty="0">
+                <a:latin typeface="Times New Roman" panose="02020603050405020304" pitchFamily="18" charset="0"/>
+                <a:cs typeface="Times New Roman" panose="02020603050405020304" pitchFamily="18" charset="0"/>
+              </a:rPr>
+              <a:t>, </a:t>
+            </a:r>
+            <a:r>
+              <a:rPr lang="en-US" sz="2400" i="1" dirty="0">
+                <a:latin typeface="Times New Roman" panose="02020603050405020304" pitchFamily="18" charset="0"/>
+                <a:cs typeface="Times New Roman" panose="02020603050405020304" pitchFamily="18" charset="0"/>
+              </a:rPr>
+              <a:t>92</a:t>
+            </a:r>
+            <a:r>
+              <a:rPr lang="en-US" sz="2400" dirty="0">
+                <a:latin typeface="Times New Roman" panose="02020603050405020304" pitchFamily="18" charset="0"/>
+                <a:cs typeface="Times New Roman" panose="02020603050405020304" pitchFamily="18" charset="0"/>
+              </a:rPr>
+              <a:t>(4), 945–964. </a:t>
+            </a:r>
+          </a:p>
+          <a:p>
+            <a:r>
+              <a:rPr lang="en-US" sz="2400" dirty="0">
+                <a:latin typeface="Times New Roman" panose="02020603050405020304" pitchFamily="18" charset="0"/>
+                <a:cs typeface="Times New Roman" panose="02020603050405020304" pitchFamily="18" charset="0"/>
+              </a:rPr>
+              <a:t>U.S. Department of Labor, Wage and Hour Division. (2024). </a:t>
+            </a:r>
+            <a:r>
+              <a:rPr lang="en-US" sz="2400" i="1" dirty="0">
+                <a:latin typeface="Times New Roman" panose="02020603050405020304" pitchFamily="18" charset="0"/>
+                <a:cs typeface="Times New Roman" panose="02020603050405020304" pitchFamily="18" charset="0"/>
+              </a:rPr>
+              <a:t>Changes in Basic Minimum Wages in Non-Farm Employment Under State Law: Selected Years 1968 to 2024. </a:t>
+            </a:r>
+          </a:p>
+          <a:p>
+            <a:r>
+              <a:rPr lang="en-US" sz="2400" dirty="0">
+                <a:latin typeface="Times New Roman" panose="02020603050405020304" pitchFamily="18" charset="0"/>
+                <a:cs typeface="Times New Roman" panose="02020603050405020304" pitchFamily="18" charset="0"/>
+              </a:rPr>
+              <a:t>U.S. Bureau of Labor Statistics. (2024). </a:t>
+            </a:r>
+            <a:r>
+              <a:rPr lang="en-US" sz="2400" i="1" dirty="0">
+                <a:latin typeface="Times New Roman" panose="02020603050405020304" pitchFamily="18" charset="0"/>
+                <a:cs typeface="Times New Roman" panose="02020603050405020304" pitchFamily="18" charset="0"/>
+              </a:rPr>
+              <a:t>Local Area Unemployment Statistics (LAUS). </a:t>
+            </a:r>
+            <a:endParaRPr lang="en-US" sz="2400" dirty="0">
+              <a:latin typeface="Times New Roman" panose="02020603050405020304" pitchFamily="18" charset="0"/>
+              <a:cs typeface="Times New Roman" panose="02020603050405020304" pitchFamily="18" charset="0"/>
+            </a:endParaRPr>
+          </a:p>
+          <a:p>
+            <a:r>
+              <a:rPr lang="en-US" sz="2400" dirty="0">
+                <a:latin typeface="Times New Roman" panose="02020603050405020304" pitchFamily="18" charset="0"/>
+                <a:cs typeface="Times New Roman" panose="02020603050405020304" pitchFamily="18" charset="0"/>
+              </a:rPr>
+              <a:t>Winkler, M. R., </a:t>
+            </a:r>
+            <a:r>
+              <a:rPr lang="en-US" sz="2400" dirty="0" err="1">
+                <a:latin typeface="Times New Roman" panose="02020603050405020304" pitchFamily="18" charset="0"/>
+                <a:cs typeface="Times New Roman" panose="02020603050405020304" pitchFamily="18" charset="0"/>
+              </a:rPr>
+              <a:t>Clohan</a:t>
+            </a:r>
+            <a:r>
+              <a:rPr lang="en-US" sz="2400" dirty="0">
+                <a:latin typeface="Times New Roman" panose="02020603050405020304" pitchFamily="18" charset="0"/>
+                <a:cs typeface="Times New Roman" panose="02020603050405020304" pitchFamily="18" charset="0"/>
+              </a:rPr>
+              <a:t>, R., Komro, K. A., Livingston, M. D., &amp; Markowitz, S. (2025). State minimum wage and food insecurity among US households with children. </a:t>
+            </a:r>
+            <a:r>
+              <a:rPr lang="en-US" sz="2400" i="1" dirty="0">
+                <a:latin typeface="Times New Roman" panose="02020603050405020304" pitchFamily="18" charset="0"/>
+                <a:cs typeface="Times New Roman" panose="02020603050405020304" pitchFamily="18" charset="0"/>
+              </a:rPr>
+              <a:t>JAMA Network Open, 8</a:t>
+            </a:r>
+            <a:r>
+              <a:rPr lang="en-US" sz="2400" dirty="0">
+                <a:latin typeface="Times New Roman" panose="02020603050405020304" pitchFamily="18" charset="0"/>
+                <a:cs typeface="Times New Roman" panose="02020603050405020304" pitchFamily="18" charset="0"/>
+              </a:rPr>
+              <a:t>(3), e252043. </a:t>
+            </a:r>
+          </a:p>
+          <a:p>
             <a:pPr algn="ctr"/>
-            <a:endParaRPr lang="en-US" sz="2400" dirty="0">
+            <a:endParaRPr lang="en-US" sz="4400" dirty="0">
               <a:latin typeface="Arial"/>
               <a:cs typeface="Arial"/>
             </a:endParaRPr>
           </a:p>
-          <a:p>
-            <a:r>
-              <a:rPr lang="en-US" sz="3200" dirty="0">
-                <a:latin typeface="Times New Roman"/>
-                <a:cs typeface="Times New Roman"/>
-              </a:rPr>
-              <a:t>You should include a list of scholarly articles/books and other resources that you cited on your poster (for a Works Cited or Literature Cited section).  If you label this section a Bibliography, then your list includes items that you consulted for the project, but did not necessarily cite on your poster.</a:t>
-            </a:r>
-          </a:p>
-          <a:p>
-            <a:endParaRPr lang="en-US" sz="3200" dirty="0">
-              <a:latin typeface="Times New Roman"/>
-              <a:cs typeface="Times New Roman"/>
-            </a:endParaRPr>
-          </a:p>
-          <a:p>
-            <a:r>
-              <a:rPr lang="en-US" sz="3200" dirty="0">
-                <a:latin typeface="Times New Roman"/>
-                <a:cs typeface="Times New Roman"/>
-              </a:rPr>
-              <a:t>Check with your research mentor on how to properly format the citations in your academic discipline.</a:t>
-            </a:r>
-          </a:p>
-        </p:txBody>
-      </p:sp>
-      <mc:AlternateContent xmlns:mc="http://schemas.openxmlformats.org/markup-compatibility/2006">
-        <mc:Choice xmlns:a14="http://schemas.microsoft.com/office/drawing/2010/main" Requires="a14">
+        </p:txBody>
+      </p:sp>
+      <mc:AlternateContent xmlns:mc="http://schemas.openxmlformats.org/markup-compatibility/2006" xmlns:a14="http://schemas.microsoft.com/office/drawing/2010/main">
+        <mc:Choice Requires="a14">
           <p:sp>
             <p:nvSpPr>
               <p:cNvPr id="3" name="TextBox 2">
@@ -4056,8 +4120,8 @@
             </p:nvSpPr>
             <p:spPr>
               <a:xfrm>
-                <a:off x="1905026" y="17296271"/>
-                <a:ext cx="10410596" cy="15542716"/>
+                <a:off x="1140104" y="17794173"/>
+                <a:ext cx="10410596" cy="14619387"/>
               </a:xfrm>
               <a:prstGeom prst="rect">
                 <a:avLst/>
@@ -4237,6 +4301,7 @@
                 </a:r>
               </a:p>
               <a:p>
+                <a:pPr/>
                 <a14:m>
                   <m:oMathPara xmlns:m="http://schemas.openxmlformats.org/officeDocument/2006/math">
                     <m:oMathParaPr>
@@ -4568,42 +4633,13 @@
                     <a:latin typeface="Times New Roman" panose="02020603050405020304" pitchFamily="18" charset="0"/>
                     <a:cs typeface="Times New Roman" panose="02020603050405020304" pitchFamily="18" charset="0"/>
                   </a:rPr>
-                  <a:t>Treatment is defined as the first year a state increases its minimum wage</a:t>
+                  <a:t>Treatment is defined as the first year a state increases its minimum wage.</a:t>
                 </a:r>
-              </a:p>
-              <a:p>
-                <a:r>
-                  <a:rPr lang="en-US" sz="3000" dirty="0">
-                    <a:latin typeface="Times New Roman" panose="02020603050405020304" pitchFamily="18" charset="0"/>
-                    <a:cs typeface="Times New Roman" panose="02020603050405020304" pitchFamily="18" charset="0"/>
-                  </a:rPr>
-                  <a:t>-This approach avoids biases known to arise in traditional two-way fixed effects </a:t>
-                </a:r>
-                <a:r>
-                  <a:rPr lang="en-US" sz="3000" dirty="0" err="1">
-                    <a:latin typeface="Times New Roman" panose="02020603050405020304" pitchFamily="18" charset="0"/>
-                    <a:cs typeface="Times New Roman" panose="02020603050405020304" pitchFamily="18" charset="0"/>
-                  </a:rPr>
-                  <a:t>DiD</a:t>
-                </a:r>
-                <a:r>
-                  <a:rPr lang="en-US" sz="3000" dirty="0">
-                    <a:latin typeface="Times New Roman" panose="02020603050405020304" pitchFamily="18" charset="0"/>
-                    <a:cs typeface="Times New Roman" panose="02020603050405020304" pitchFamily="18" charset="0"/>
-                  </a:rPr>
-                  <a:t> under heterogeneous treatment timing.</a:t>
-                </a:r>
-              </a:p>
-              <a:p>
-                <a:endParaRPr lang="en-US" sz="3000" dirty="0">
-                  <a:latin typeface="Times New Roman" panose="02020603050405020304" pitchFamily="18" charset="0"/>
-                  <a:cs typeface="Times New Roman" panose="02020603050405020304" pitchFamily="18" charset="0"/>
-                </a:endParaRPr>
               </a:p>
             </p:txBody>
           </p:sp>
         </mc:Choice>
-        <mc:Fallback>
+        <mc:Fallback xmlns="">
           <p:sp>
             <p:nvSpPr>
               <p:cNvPr id="3" name="TextBox 2">
@@ -4620,14 +4656,14 @@
             </p:nvSpPr>
             <p:spPr>
               <a:xfrm>
-                <a:off x="1905026" y="17296271"/>
-                <a:ext cx="10410596" cy="15542716"/>
+                <a:off x="1140104" y="17794173"/>
+                <a:ext cx="10410596" cy="14619387"/>
               </a:xfrm>
               <a:prstGeom prst="rect">
                 <a:avLst/>
               </a:prstGeom>
               <a:blipFill>
-                <a:blip r:embed="rId5"/>
+                <a:blip r:embed="rId2"/>
                 <a:stretch>
                   <a:fillRect/>
                 </a:stretch>
@@ -4657,6 +4693,305 @@
           </p:sp>
         </mc:Fallback>
       </mc:AlternateContent>
+      <p:pic>
+        <p:nvPicPr>
+          <p:cNvPr id="22" name="Picture 21">
+            <a:extLst>
+              <a:ext uri="{FF2B5EF4-FFF2-40B4-BE49-F238E27FC236}">
+                <a16:creationId xmlns:a16="http://schemas.microsoft.com/office/drawing/2014/main" id="{38B8C16C-F02C-D470-8834-2C39AC0514F4}"/>
+              </a:ext>
+            </a:extLst>
+          </p:cNvPr>
+          <p:cNvPicPr>
+            <a:picLocks noChangeAspect="1"/>
+          </p:cNvPicPr>
+          <p:nvPr/>
+        </p:nvPicPr>
+        <p:blipFill>
+          <a:blip r:embed="rId3"/>
+          <a:stretch>
+            <a:fillRect/>
+          </a:stretch>
+        </p:blipFill>
+        <p:spPr>
+          <a:xfrm>
+            <a:off x="27395829" y="9428724"/>
+            <a:ext cx="9971524" cy="5982914"/>
+          </a:xfrm>
+          <a:prstGeom prst="rect">
+            <a:avLst/>
+          </a:prstGeom>
+        </p:spPr>
+      </p:pic>
+      <p:pic>
+        <p:nvPicPr>
+          <p:cNvPr id="24" name="Picture 23">
+            <a:extLst>
+              <a:ext uri="{FF2B5EF4-FFF2-40B4-BE49-F238E27FC236}">
+                <a16:creationId xmlns:a16="http://schemas.microsoft.com/office/drawing/2014/main" id="{B4B1B207-06A2-BC6A-A310-DDCAF727FB78}"/>
+              </a:ext>
+            </a:extLst>
+          </p:cNvPr>
+          <p:cNvPicPr>
+            <a:picLocks noChangeAspect="1"/>
+          </p:cNvPicPr>
+          <p:nvPr/>
+        </p:nvPicPr>
+        <p:blipFill>
+          <a:blip r:embed="rId4"/>
+          <a:stretch>
+            <a:fillRect/>
+          </a:stretch>
+        </p:blipFill>
+        <p:spPr>
+          <a:xfrm>
+            <a:off x="27398732" y="20378388"/>
+            <a:ext cx="9971522" cy="6903360"/>
+          </a:xfrm>
+          <a:prstGeom prst="rect">
+            <a:avLst/>
+          </a:prstGeom>
+        </p:spPr>
+      </p:pic>
+      <p:sp>
+        <p:nvSpPr>
+          <p:cNvPr id="25" name="TextBox 24">
+            <a:extLst>
+              <a:ext uri="{FF2B5EF4-FFF2-40B4-BE49-F238E27FC236}">
+                <a16:creationId xmlns:a16="http://schemas.microsoft.com/office/drawing/2014/main" id="{35963C68-1828-1FD7-53B2-825CF3470E71}"/>
+              </a:ext>
+            </a:extLst>
+          </p:cNvPr>
+          <p:cNvSpPr txBox="1"/>
+          <p:nvPr/>
+        </p:nvSpPr>
+        <p:spPr>
+          <a:xfrm>
+            <a:off x="12864163" y="26812654"/>
+            <a:ext cx="10802787" cy="3539430"/>
+          </a:xfrm>
+          <a:prstGeom prst="rect">
+            <a:avLst/>
+          </a:prstGeom>
+          <a:noFill/>
+        </p:spPr>
+        <p:txBody>
+          <a:bodyPr wrap="square" rtlCol="0">
+            <a:spAutoFit/>
+          </a:bodyPr>
+          <a:lstStyle/>
+          <a:p>
+            <a:r>
+              <a:rPr lang="en-US" sz="2800" dirty="0">
+                <a:latin typeface="Times New Roman" panose="02020603050405020304" pitchFamily="18" charset="0"/>
+                <a:cs typeface="Times New Roman" panose="02020603050405020304" pitchFamily="18" charset="0"/>
+              </a:rPr>
+              <a:t>Table 1. Two-Way Fixed Effects Estimates of Minimum Wage Effects on Poverty. The table reports population-weighted two-way fixed effects estimates of the relationship between the real minimum wage and poverty rates among full-time low-wage workers. Column (1) includes state and year fixed effects with covariates. Column (2) adds state-specific linear time trends. Standard errors clustered by state are shown in parentheses. Statistical significance is denoted by . p &lt; 0.1, * p &lt; 0.05, ** p &lt; 0.01, and *** p &lt; 0.001.</a:t>
+            </a:r>
+          </a:p>
+        </p:txBody>
+      </p:sp>
+      <p:pic>
+        <p:nvPicPr>
+          <p:cNvPr id="27" name="Picture 26">
+            <a:extLst>
+              <a:ext uri="{FF2B5EF4-FFF2-40B4-BE49-F238E27FC236}">
+                <a16:creationId xmlns:a16="http://schemas.microsoft.com/office/drawing/2014/main" id="{C002A6AE-4C15-FDA0-D891-1194904AA45E}"/>
+              </a:ext>
+            </a:extLst>
+          </p:cNvPr>
+          <p:cNvPicPr>
+            <a:picLocks noChangeAspect="1"/>
+          </p:cNvPicPr>
+          <p:nvPr/>
+        </p:nvPicPr>
+        <p:blipFill>
+          <a:blip r:embed="rId5"/>
+          <a:srcRect t="4222" b="4726"/>
+          <a:stretch>
+            <a:fillRect/>
+          </a:stretch>
+        </p:blipFill>
+        <p:spPr>
+          <a:xfrm>
+            <a:off x="12655052" y="20903143"/>
+            <a:ext cx="11705746" cy="5909511"/>
+          </a:xfrm>
+          <a:prstGeom prst="rect">
+            <a:avLst/>
+          </a:prstGeom>
+        </p:spPr>
+      </p:pic>
+      <p:sp>
+        <p:nvSpPr>
+          <p:cNvPr id="28" name="TextBox 27">
+            <a:extLst>
+              <a:ext uri="{FF2B5EF4-FFF2-40B4-BE49-F238E27FC236}">
+                <a16:creationId xmlns:a16="http://schemas.microsoft.com/office/drawing/2014/main" id="{3717F5C8-F8DE-4649-BFDA-0B7C30996B1E}"/>
+              </a:ext>
+            </a:extLst>
+          </p:cNvPr>
+          <p:cNvSpPr txBox="1"/>
+          <p:nvPr/>
+        </p:nvSpPr>
+        <p:spPr>
+          <a:xfrm>
+            <a:off x="27398732" y="15778272"/>
+            <a:ext cx="9971523" cy="3108543"/>
+          </a:xfrm>
+          <a:prstGeom prst="rect">
+            <a:avLst/>
+          </a:prstGeom>
+          <a:noFill/>
+        </p:spPr>
+        <p:txBody>
+          <a:bodyPr wrap="square" rtlCol="0">
+            <a:spAutoFit/>
+          </a:bodyPr>
+          <a:lstStyle/>
+          <a:p>
+            <a:r>
+              <a:rPr lang="en-US" sz="2800" dirty="0">
+                <a:latin typeface="Times New Roman" panose="02020603050405020304" pitchFamily="18" charset="0"/>
+                <a:cs typeface="Times New Roman" panose="02020603050405020304" pitchFamily="18" charset="0"/>
+              </a:rPr>
+              <a:t>Figure 1. Event Study of Minimum Wage Increases on Poverty Rates. Event-study estimates of the average treatment effect on the treated following minimum wage increases are pictured, using the staggered difference-in-differences estimator with covariates. Points represent estimated effects by event time. Pre-treatment estimates cluster near zero, while post-treatment estimates suggest modest declines in poverty with substantial uncertainty.</a:t>
+            </a:r>
+          </a:p>
+        </p:txBody>
+      </p:sp>
+      <p:sp>
+        <p:nvSpPr>
+          <p:cNvPr id="29" name="TextBox 28">
+            <a:extLst>
+              <a:ext uri="{FF2B5EF4-FFF2-40B4-BE49-F238E27FC236}">
+                <a16:creationId xmlns:a16="http://schemas.microsoft.com/office/drawing/2014/main" id="{6969B562-9AB3-ECF3-6806-169B1DF580F4}"/>
+              </a:ext>
+            </a:extLst>
+          </p:cNvPr>
+          <p:cNvSpPr txBox="1"/>
+          <p:nvPr/>
+        </p:nvSpPr>
+        <p:spPr>
+          <a:xfrm>
+            <a:off x="27398730" y="27281748"/>
+            <a:ext cx="9971524" cy="2246769"/>
+          </a:xfrm>
+          <a:prstGeom prst="rect">
+            <a:avLst/>
+          </a:prstGeom>
+          <a:noFill/>
+        </p:spPr>
+        <p:txBody>
+          <a:bodyPr wrap="square" rtlCol="0">
+            <a:spAutoFit/>
+          </a:bodyPr>
+          <a:lstStyle/>
+          <a:p>
+            <a:r>
+              <a:rPr lang="en-US" sz="2800" dirty="0">
+                <a:latin typeface="Times New Roman" panose="02020603050405020304" pitchFamily="18" charset="0"/>
+                <a:cs typeface="Times New Roman" panose="02020603050405020304" pitchFamily="18" charset="0"/>
+              </a:rPr>
+              <a:t>Figure 2. Parallel Trends in Poverty Rates for Treated and Control States. Mean poverty rates for treated and control states prior to minimum wage increases. Similar pre-treatment trajectories provide descriptive support for the parallel trends assumption underlying the difference-in-differences framework.</a:t>
+            </a:r>
+          </a:p>
+        </p:txBody>
+      </p:sp>
+      <p:pic>
+        <p:nvPicPr>
+          <p:cNvPr id="1032" name="Picture 8" descr="Spirit Denison University Round Mouse Pad – Shop Denison University">
+            <a:extLst>
+              <a:ext uri="{FF2B5EF4-FFF2-40B4-BE49-F238E27FC236}">
+                <a16:creationId xmlns:a16="http://schemas.microsoft.com/office/drawing/2014/main" id="{1DF73F98-8776-36AD-99FE-02073A00DFC7}"/>
+              </a:ext>
+            </a:extLst>
+          </p:cNvPr>
+          <p:cNvPicPr>
+            <a:picLocks noChangeAspect="1" noChangeArrowheads="1"/>
+          </p:cNvPicPr>
+          <p:nvPr/>
+        </p:nvPicPr>
+        <p:blipFill>
+          <a:blip r:embed="rId6">
+            <a:extLst>
+              <a:ext uri="{28A0092B-C50C-407E-A947-70E740481C1C}">
+                <a14:useLocalDpi xmlns:a14="http://schemas.microsoft.com/office/drawing/2010/main" val="0"/>
+              </a:ext>
+            </a:extLst>
+          </a:blip>
+          <a:srcRect/>
+          <a:stretch>
+            <a:fillRect/>
+          </a:stretch>
+        </p:blipFill>
+        <p:spPr bwMode="auto">
+          <a:xfrm>
+            <a:off x="44598407" y="1605696"/>
+            <a:ext cx="5715000" cy="5715000"/>
+          </a:xfrm>
+          <a:prstGeom prst="rect">
+            <a:avLst/>
+          </a:prstGeom>
+          <a:noFill/>
+          <a:extLst>
+            <a:ext uri="{909E8E84-426E-40DD-AFC4-6F175D3DCCD1}">
+              <a14:hiddenFill xmlns:a14="http://schemas.microsoft.com/office/drawing/2010/main">
+                <a:solidFill>
+                  <a:srgbClr val="FFFFFF"/>
+                </a:solidFill>
+              </a14:hiddenFill>
+            </a:ext>
+          </a:extLst>
+        </p:spPr>
+      </p:pic>
+      <p:pic>
+        <p:nvPicPr>
+          <p:cNvPr id="1036" name="Picture 12" descr="DataConnect Conference | October 2-3, 2025 | Hosted by Women in Analytics">
+            <a:extLst>
+              <a:ext uri="{FF2B5EF4-FFF2-40B4-BE49-F238E27FC236}">
+                <a16:creationId xmlns:a16="http://schemas.microsoft.com/office/drawing/2014/main" id="{70C71F86-23CC-72DF-AB41-EAC66A01E991}"/>
+              </a:ext>
+            </a:extLst>
+          </p:cNvPr>
+          <p:cNvPicPr>
+            <a:picLocks noChangeAspect="1" noChangeArrowheads="1"/>
+          </p:cNvPicPr>
+          <p:nvPr/>
+        </p:nvPicPr>
+        <p:blipFill>
+          <a:blip r:embed="rId7">
+            <a:extLst>
+              <a:ext uri="{28A0092B-C50C-407E-A947-70E740481C1C}">
+                <a14:useLocalDpi xmlns:a14="http://schemas.microsoft.com/office/drawing/2010/main" val="0"/>
+              </a:ext>
+            </a:extLst>
+          </a:blip>
+          <a:srcRect/>
+          <a:stretch>
+            <a:fillRect/>
+          </a:stretch>
+        </p:blipFill>
+        <p:spPr bwMode="auto">
+          <a:xfrm>
+            <a:off x="1140104" y="3331645"/>
+            <a:ext cx="6200349" cy="2392941"/>
+          </a:xfrm>
+          <a:prstGeom prst="rect">
+            <a:avLst/>
+          </a:prstGeom>
+          <a:noFill/>
+          <a:extLst>
+            <a:ext uri="{909E8E84-426E-40DD-AFC4-6F175D3DCCD1}">
+              <a14:hiddenFill xmlns:a14="http://schemas.microsoft.com/office/drawing/2010/main">
+                <a:solidFill>
+                  <a:srgbClr val="FFFFFF"/>
+                </a:solidFill>
+              </a14:hiddenFill>
+            </a:ext>
+          </a:extLst>
+        </p:spPr>
+      </p:pic>
     </p:spTree>
   </p:cSld>
   <p:clrMapOvr>

</xml_diff>